<commit_message>
Consistent quotes, fix typo in produce-cmd
</commit_message>
<xml_diff>
--- a/working/dod/OpenC2 Schema.pptx
+++ b/working/dod/OpenC2 Schema.pptx
@@ -5,7 +5,7 @@
     <p:sldMasterId id="2147483660" r:id="rId1"/>
   </p:sldMasterIdLst>
   <p:notesMasterIdLst>
-    <p:notesMasterId r:id="rId13"/>
+    <p:notesMasterId r:id="rId14"/>
   </p:notesMasterIdLst>
   <p:sldIdLst>
     <p:sldId id="385" r:id="rId2"/>
@@ -18,7 +18,8 @@
     <p:sldId id="425" r:id="rId9"/>
     <p:sldId id="426" r:id="rId10"/>
     <p:sldId id="428" r:id="rId11"/>
-    <p:sldId id="427" r:id="rId12"/>
+    <p:sldId id="429" r:id="rId12"/>
+    <p:sldId id="427" r:id="rId13"/>
   </p:sldIdLst>
   <p:sldSz cx="9144000" cy="6858000" type="screen4x3"/>
   <p:notesSz cx="6858000" cy="9144000"/>
@@ -209,7 +210,7 @@
             <a:fld id="{BEA7D905-4A79-4EB8-82BB-49D7A73CDC36}" type="datetimeFigureOut">
               <a:rPr lang="en-US" smtClean="0"/>
               <a:pPr/>
-              <a:t>8/26/2016</a:t>
+              <a:t>8/30/2016</a:t>
             </a:fld>
             <a:endParaRPr lang="en-US" dirty="0"/>
           </a:p>
@@ -1105,7 +1106,7 @@
             <a:pPr algn="ctr" eaLnBrk="1" latinLnBrk="0" hangingPunct="1"/>
             <a:fld id="{BB43FE8B-308F-4382-9655-46B1789E94EF}" type="datetime1">
               <a:rPr lang="en-US" smtClean="0"/>
-              <a:t>8/26/2016</a:t>
+              <a:t>8/30/2016</a:t>
             </a:fld>
             <a:endParaRPr lang="en-US" sz="2000" dirty="0">
               <a:solidFill>
@@ -1311,7 +1312,7 @@
             <a:pPr eaLnBrk="1" latinLnBrk="0" hangingPunct="1"/>
             <a:fld id="{61D71F59-622D-49DD-A407-F9C971171EED}" type="datetime1">
               <a:rPr lang="en-US" smtClean="0"/>
-              <a:t>8/26/2016</a:t>
+              <a:t>8/30/2016</a:t>
             </a:fld>
             <a:endParaRPr lang="en-US" dirty="0"/>
           </a:p>
@@ -1493,7 +1494,7 @@
             <a:pPr eaLnBrk="1" latinLnBrk="0" hangingPunct="1"/>
             <a:fld id="{D732FB50-16D0-471D-8C85-B8A6C1DE6B65}" type="datetime1">
               <a:rPr lang="en-US" smtClean="0"/>
-              <a:t>8/26/2016</a:t>
+              <a:t>8/30/2016</a:t>
             </a:fld>
             <a:endParaRPr lang="en-US" dirty="0"/>
           </a:p>
@@ -1766,7 +1767,7 @@
             <a:pPr eaLnBrk="1" latinLnBrk="0" hangingPunct="1"/>
             <a:fld id="{466872B2-7238-4135-B3D9-97A1357E2E20}" type="datetime1">
               <a:rPr lang="en-US" smtClean="0"/>
-              <a:t>8/26/2016</a:t>
+              <a:t>8/30/2016</a:t>
             </a:fld>
             <a:endParaRPr lang="en-US" dirty="0"/>
           </a:p>
@@ -2209,7 +2210,7 @@
             <a:pPr eaLnBrk="1" latinLnBrk="0" hangingPunct="1"/>
             <a:fld id="{49DE1B7C-1FDD-42FD-9A06-6AC00313877F}" type="datetime1">
               <a:rPr lang="en-US" smtClean="0"/>
-              <a:t>8/26/2016</a:t>
+              <a:t>8/30/2016</a:t>
             </a:fld>
             <a:endParaRPr lang="en-US" dirty="0"/>
           </a:p>
@@ -2458,7 +2459,7 @@
             <a:pPr eaLnBrk="1" latinLnBrk="0" hangingPunct="1"/>
             <a:fld id="{537DA086-46E6-41E7-A73A-2CEE4966C500}" type="datetime1">
               <a:rPr lang="en-US" smtClean="0"/>
-              <a:t>8/26/2016</a:t>
+              <a:t>8/30/2016</a:t>
             </a:fld>
             <a:endParaRPr lang="en-US" dirty="0"/>
           </a:p>
@@ -2697,7 +2698,7 @@
             <a:pPr eaLnBrk="1" latinLnBrk="0" hangingPunct="1"/>
             <a:fld id="{3E9231E7-997A-412D-84DC-9B00410FEBC3}" type="datetime1">
               <a:rPr lang="en-US" smtClean="0"/>
-              <a:t>8/26/2016</a:t>
+              <a:t>8/30/2016</a:t>
             </a:fld>
             <a:endParaRPr lang="en-US" dirty="0"/>
           </a:p>
@@ -2895,7 +2896,7 @@
             <a:pPr eaLnBrk="1" latinLnBrk="0" hangingPunct="1"/>
             <a:fld id="{0FCB485A-B0BE-4563-90F2-538DF71CFB72}" type="datetime1">
               <a:rPr lang="en-US" smtClean="0"/>
-              <a:t>8/26/2016</a:t>
+              <a:t>8/30/2016</a:t>
             </a:fld>
             <a:endParaRPr lang="en-US" dirty="0"/>
           </a:p>
@@ -2999,7 +3000,7 @@
             <a:pPr eaLnBrk="1" latinLnBrk="0" hangingPunct="1"/>
             <a:fld id="{7673D3E5-681E-495A-9A20-B77690DC2AC4}" type="datetime1">
               <a:rPr lang="en-US" smtClean="0"/>
-              <a:t>8/26/2016</a:t>
+              <a:t>8/30/2016</a:t>
             </a:fld>
             <a:endParaRPr lang="en-US" dirty="0"/>
           </a:p>
@@ -3141,7 +3142,7 @@
             <a:pPr eaLnBrk="1" latinLnBrk="0" hangingPunct="1"/>
             <a:fld id="{36ADC30D-043F-4BA3-9E5F-DC13212B92AB}" type="datetime1">
               <a:rPr lang="en-US" smtClean="0"/>
-              <a:t>8/26/2016</a:t>
+              <a:t>8/30/2016</a:t>
             </a:fld>
             <a:endParaRPr lang="en-US" dirty="0"/>
           </a:p>
@@ -3660,7 +3661,7 @@
             <a:pPr eaLnBrk="1" latinLnBrk="0" hangingPunct="1"/>
             <a:fld id="{2A59F7D6-4F9A-47A6-ADCC-8BE2C05F1F8B}" type="datetime1">
               <a:rPr lang="en-US" smtClean="0"/>
-              <a:t>8/26/2016</a:t>
+              <a:t>8/30/2016</a:t>
             </a:fld>
             <a:endParaRPr lang="en-US" dirty="0"/>
           </a:p>
@@ -3924,7 +3925,7 @@
             <a:pPr eaLnBrk="1" latinLnBrk="0" hangingPunct="1"/>
             <a:fld id="{16C4A91E-8137-4654-B5C3-88E0D304AEC4}" type="datetime1">
               <a:rPr lang="en-US" smtClean="0"/>
-              <a:t>8/26/2016</a:t>
+              <a:t>8/30/2016</a:t>
             </a:fld>
             <a:endParaRPr lang="en-US" sz="1400" dirty="0">
               <a:solidFill>
@@ -4829,7 +4830,7 @@
           <a:p>
             <a:r>
               <a:rPr lang="en-US" dirty="0" smtClean="0"/>
-              <a:t>JSON Abstract Syntax Notation (JASN)</a:t>
+              <a:t>JSON Encodings</a:t>
             </a:r>
             <a:endParaRPr lang="en-US" dirty="0"/>
           </a:p>
@@ -4877,24 +4878,98 @@
         </p:nvSpPr>
         <p:spPr/>
         <p:txBody>
-          <a:bodyPr/>
+          <a:bodyPr>
+            <a:normAutofit fontScale="92500" lnSpcReduction="10000"/>
+          </a:bodyPr>
           <a:lstStyle/>
           <a:p>
             <a:r>
               <a:rPr lang="en-US" dirty="0" smtClean="0"/>
-              <a:t>JSON document that defines an abstract schema</a:t>
-            </a:r>
-          </a:p>
-          <a:p>
+              <a:t>Verbose</a:t>
+            </a:r>
+          </a:p>
+          <a:p>
+            <a:pPr lvl="2"/>
             <a:r>
               <a:rPr lang="en-US" dirty="0" smtClean="0"/>
-              <a:t>Translate to concrete schemas</a:t>
-            </a:r>
-          </a:p>
-          <a:p>
+              <a:t>Records encoded as Objects</a:t>
+            </a:r>
+          </a:p>
+          <a:p>
+            <a:pPr lvl="2"/>
             <a:r>
               <a:rPr lang="en-US" dirty="0" smtClean="0"/>
-              <a:t>Import directly by applications</a:t>
+              <a:t>Highest bandwidth</a:t>
+            </a:r>
+          </a:p>
+          <a:p>
+            <a:pPr lvl="2"/>
+            <a:r>
+              <a:rPr lang="en-US" dirty="0" smtClean="0"/>
+              <a:t>Arguably most human-readable (explicit field names)</a:t>
+            </a:r>
+            <a:endParaRPr lang="en-US" dirty="0" smtClean="0"/>
+          </a:p>
+          <a:p>
+            <a:r>
+              <a:rPr lang="en-US" dirty="0" smtClean="0"/>
+              <a:t>Concise</a:t>
+            </a:r>
+          </a:p>
+          <a:p>
+            <a:pPr lvl="2"/>
+            <a:r>
+              <a:rPr lang="en-US" dirty="0" smtClean="0"/>
+              <a:t>Records encoded as Arrays</a:t>
+            </a:r>
+          </a:p>
+          <a:p>
+            <a:pPr lvl="2"/>
+            <a:r>
+              <a:rPr lang="en-US" dirty="0" smtClean="0"/>
+              <a:t>Reduced bandwidth</a:t>
+            </a:r>
+          </a:p>
+          <a:p>
+            <a:pPr lvl="2"/>
+            <a:r>
+              <a:rPr lang="en-US" dirty="0" smtClean="0"/>
+              <a:t>Arguably more readable (no field name clutter)</a:t>
+            </a:r>
+          </a:p>
+          <a:p>
+            <a:r>
+              <a:rPr lang="en-US" dirty="0" smtClean="0"/>
+              <a:t>Minimized</a:t>
+            </a:r>
+          </a:p>
+          <a:p>
+            <a:pPr lvl="2"/>
+            <a:r>
+              <a:rPr lang="en-US" dirty="0" smtClean="0"/>
+              <a:t>Records encoded as Arrays, Names encoded as Tags</a:t>
+            </a:r>
+          </a:p>
+          <a:p>
+            <a:pPr lvl="2"/>
+            <a:r>
+              <a:rPr lang="en-US" dirty="0" smtClean="0"/>
+              <a:t>Most bandwidth efficient, </a:t>
+            </a:r>
+            <a:r>
+              <a:rPr lang="en-US" dirty="0"/>
+              <a:t>l</a:t>
+            </a:r>
+            <a:r>
+              <a:rPr lang="en-US" dirty="0" smtClean="0"/>
+              <a:t>east readable</a:t>
+            </a:r>
+          </a:p>
+          <a:p>
+            <a:pPr lvl="2"/>
+            <a:r>
+              <a:rPr lang="en-US" dirty="0" smtClean="0"/>
+              <a:t>Use directly for transmission, or as visualization of binary encoding</a:t>
             </a:r>
             <a:endParaRPr lang="en-US" dirty="0"/>
           </a:p>
@@ -4914,6 +4989,124 @@
 </file>
 
 <file path=ppt/slides/slide11.xml><?xml version="1.0" encoding="utf-8"?>
+<p:sld xmlns:a="http://schemas.openxmlformats.org/drawingml/2006/main" xmlns:r="http://schemas.openxmlformats.org/officeDocument/2006/relationships" xmlns:p="http://schemas.openxmlformats.org/presentationml/2006/main">
+  <p:cSld>
+    <p:spTree>
+      <p:nvGrpSpPr>
+        <p:cNvPr id="1" name=""/>
+        <p:cNvGrpSpPr/>
+        <p:nvPr/>
+      </p:nvGrpSpPr>
+      <p:grpSpPr>
+        <a:xfrm>
+          <a:off x="0" y="0"/>
+          <a:ext cx="0" cy="0"/>
+          <a:chOff x="0" y="0"/>
+          <a:chExt cx="0" cy="0"/>
+        </a:xfrm>
+      </p:grpSpPr>
+      <p:sp>
+        <p:nvSpPr>
+          <p:cNvPr id="2" name="Title 1"/>
+          <p:cNvSpPr>
+            <a:spLocks noGrp="1"/>
+          </p:cNvSpPr>
+          <p:nvPr>
+            <p:ph type="title"/>
+          </p:nvPr>
+        </p:nvSpPr>
+        <p:spPr/>
+        <p:txBody>
+          <a:bodyPr/>
+          <a:lstStyle/>
+          <a:p>
+            <a:r>
+              <a:rPr lang="en-US" dirty="0" smtClean="0"/>
+              <a:t>JSON Abstract Syntax Notation (JASN)</a:t>
+            </a:r>
+            <a:endParaRPr lang="en-US" dirty="0"/>
+          </a:p>
+        </p:txBody>
+      </p:sp>
+      <p:sp>
+        <p:nvSpPr>
+          <p:cNvPr id="3" name="Slide Number Placeholder 2"/>
+          <p:cNvSpPr>
+            <a:spLocks noGrp="1"/>
+          </p:cNvSpPr>
+          <p:nvPr>
+            <p:ph type="sldNum" sz="quarter" idx="12"/>
+          </p:nvPr>
+        </p:nvSpPr>
+        <p:spPr/>
+        <p:txBody>
+          <a:bodyPr>
+            <a:normAutofit fontScale="85000" lnSpcReduction="20000"/>
+          </a:bodyPr>
+          <a:lstStyle/>
+          <a:p>
+            <a:fld id="{F43FF47F-E574-4450-810A-2029F5FBFFA6}" type="slidenum">
+              <a:rPr kumimoji="0" lang="en-US" smtClean="0"/>
+              <a:pPr/>
+              <a:t>11</a:t>
+            </a:fld>
+            <a:endParaRPr kumimoji="0" lang="en-US" dirty="0">
+              <a:solidFill>
+                <a:srgbClr val="FFFFFF"/>
+              </a:solidFill>
+            </a:endParaRPr>
+          </a:p>
+        </p:txBody>
+      </p:sp>
+      <p:sp>
+        <p:nvSpPr>
+          <p:cNvPr id="4" name="Content Placeholder 3"/>
+          <p:cNvSpPr>
+            <a:spLocks noGrp="1"/>
+          </p:cNvSpPr>
+          <p:nvPr>
+            <p:ph sz="quarter" idx="1"/>
+          </p:nvPr>
+        </p:nvSpPr>
+        <p:spPr/>
+        <p:txBody>
+          <a:bodyPr/>
+          <a:lstStyle/>
+          <a:p>
+            <a:r>
+              <a:rPr lang="en-US" dirty="0" smtClean="0"/>
+              <a:t>JSON document that defines an abstract schema</a:t>
+            </a:r>
+          </a:p>
+          <a:p>
+            <a:r>
+              <a:rPr lang="en-US" dirty="0" smtClean="0"/>
+              <a:t>Translate to concrete schemas</a:t>
+            </a:r>
+          </a:p>
+          <a:p>
+            <a:r>
+              <a:rPr lang="en-US" dirty="0" smtClean="0"/>
+              <a:t>Import directly by applications</a:t>
+            </a:r>
+            <a:endParaRPr lang="en-US" dirty="0"/>
+          </a:p>
+        </p:txBody>
+      </p:sp>
+    </p:spTree>
+    <p:extLst>
+      <p:ext uri="{BB962C8B-B14F-4D97-AF65-F5344CB8AC3E}">
+        <p14:creationId xmlns:p14="http://schemas.microsoft.com/office/powerpoint/2010/main" val="2384678314"/>
+      </p:ext>
+    </p:extLst>
+  </p:cSld>
+  <p:clrMapOvr>
+    <a:masterClrMapping/>
+  </p:clrMapOvr>
+</p:sld>
+</file>
+
+<file path=ppt/slides/slide12.xml><?xml version="1.0" encoding="utf-8"?>
 <p:sld xmlns:a="http://schemas.openxmlformats.org/drawingml/2006/main" xmlns:r="http://schemas.openxmlformats.org/officeDocument/2006/relationships" xmlns:p="http://schemas.openxmlformats.org/presentationml/2006/main">
   <p:cSld>
     <p:spTree>
@@ -5186,7 +5379,7 @@
             <a:fld id="{F43FF47F-E574-4450-810A-2029F5FBFFA6}" type="slidenum">
               <a:rPr kumimoji="0" lang="en-US" smtClean="0"/>
               <a:pPr/>
-              <a:t>11</a:t>
+              <a:t>12</a:t>
             </a:fld>
             <a:endParaRPr kumimoji="0" lang="en-US" dirty="0">
               <a:solidFill>
@@ -6876,50 +7069,29 @@
               <a:rPr lang="en-US" dirty="0">
                 <a:latin typeface="Calibri" panose="020F0502020204030204" pitchFamily="34" charset="0"/>
               </a:rPr>
-              <a:t>abstract </a:t>
-            </a:r>
+              <a:t>abstract or concrete</a:t>
+            </a:r>
+          </a:p>
+          <a:p>
+            <a:pPr lvl="1"/>
             <a:r>
               <a:rPr lang="en-US" dirty="0">
                 <a:latin typeface="Calibri" panose="020F0502020204030204" pitchFamily="34" charset="0"/>
               </a:rPr>
-              <a:t>or </a:t>
+              <a:t>formal (written in a </a:t>
+            </a:r>
+            <a:r>
+              <a:rPr lang="en-US" dirty="0" smtClean="0">
+                <a:latin typeface="Calibri" panose="020F0502020204030204" pitchFamily="34" charset="0"/>
+              </a:rPr>
+              <a:t>syntax definition language</a:t>
             </a:r>
             <a:r>
               <a:rPr lang="en-US" dirty="0">
                 <a:latin typeface="Calibri" panose="020F0502020204030204" pitchFamily="34" charset="0"/>
               </a:rPr>
-              <a:t>concrete</a:t>
-            </a:r>
-          </a:p>
-          <a:p>
-            <a:pPr lvl="1"/>
-            <a:r>
-              <a:rPr lang="en-US" dirty="0">
-                <a:latin typeface="Calibri" panose="020F0502020204030204" pitchFamily="34" charset="0"/>
-              </a:rPr>
-              <a:t>formal </a:t>
-            </a:r>
-            <a:r>
-              <a:rPr lang="en-US" dirty="0">
-                <a:latin typeface="Calibri" panose="020F0502020204030204" pitchFamily="34" charset="0"/>
-              </a:rPr>
-              <a:t>(written in a </a:t>
-            </a:r>
-            <a:r>
-              <a:rPr lang="en-US" dirty="0" smtClean="0">
-                <a:latin typeface="Calibri" panose="020F0502020204030204" pitchFamily="34" charset="0"/>
-              </a:rPr>
-              <a:t>syntax definition language</a:t>
-            </a:r>
-            <a:r>
-              <a:rPr lang="en-US" dirty="0">
-                <a:latin typeface="Calibri" panose="020F0502020204030204" pitchFamily="34" charset="0"/>
-              </a:rPr>
               <a:t>) or informal</a:t>
             </a:r>
-            <a:endParaRPr lang="en-US" dirty="0">
-              <a:latin typeface="Calibri" panose="020F0502020204030204" pitchFamily="34" charset="0"/>
-            </a:endParaRPr>
           </a:p>
         </p:txBody>
       </p:sp>
@@ -7068,37 +7240,25 @@
               <a:rPr lang="en-US" dirty="0" smtClean="0">
                 <a:latin typeface="Calibri" panose="020F0502020204030204" pitchFamily="34" charset="0"/>
               </a:rPr>
-              <a:t>A</a:t>
-            </a:r>
+              <a:t>A formal language for specifying the logical structure of data that is to be exchanged between two endpoints</a:t>
+            </a:r>
+          </a:p>
+          <a:p>
+            <a:pPr lvl="2"/>
             <a:r>
               <a:rPr lang="en-US" dirty="0" smtClean="0">
                 <a:latin typeface="Calibri" panose="020F0502020204030204" pitchFamily="34" charset="0"/>
               </a:rPr>
-              <a:t> formal language for specifying the logical structure of data that is to be exchanged between two endpoints</a:t>
-            </a:r>
-          </a:p>
-          <a:p>
-            <a:pPr lvl="2"/>
+              <a:t>independent of hardware platform, operating system, programming language, local representation, etc.</a:t>
+            </a:r>
+          </a:p>
+          <a:p>
+            <a:pPr lvl="1"/>
             <a:r>
               <a:rPr lang="en-US" dirty="0" smtClean="0">
                 <a:latin typeface="Calibri" panose="020F0502020204030204" pitchFamily="34" charset="0"/>
               </a:rPr>
-              <a:t>independent of hardware platform, operating system, programming language, local representation, etc.</a:t>
-            </a:r>
-          </a:p>
-          <a:p>
-            <a:pPr lvl="1"/>
-            <a:r>
-              <a:rPr lang="en-US" dirty="0" smtClean="0">
-                <a:latin typeface="Calibri" panose="020F0502020204030204" pitchFamily="34" charset="0"/>
-              </a:rPr>
-              <a:t>S</a:t>
-            </a:r>
-            <a:r>
-              <a:rPr lang="en-US" dirty="0" smtClean="0">
-                <a:latin typeface="Calibri" panose="020F0502020204030204" pitchFamily="34" charset="0"/>
-              </a:rPr>
-              <a:t>tandard sets of rules for encoding instances of logical data structures that are specified in abstract notation</a:t>
+              <a:t>Standard sets of rules for encoding instances of logical data structures that are specified in abstract notation</a:t>
             </a:r>
           </a:p>
           <a:p>
@@ -7334,13 +7494,7 @@
               <a:rPr lang="en-US" dirty="0" smtClean="0">
                 <a:latin typeface="Calibri" panose="020F0502020204030204" pitchFamily="34" charset="0"/>
               </a:rPr>
-              <a:t>Principles and Benefits</a:t>
-            </a:r>
-            <a:r>
-              <a:rPr lang="en-US" dirty="0" smtClean="0">
-                <a:latin typeface="Calibri" panose="020F0502020204030204" pitchFamily="34" charset="0"/>
-              </a:rPr>
-              <a:t>* </a:t>
+              <a:t>Principles and Benefits* </a:t>
             </a:r>
             <a:r>
               <a:rPr lang="en-US" sz="3100" dirty="0" smtClean="0">
@@ -7588,23 +7742,7 @@
             </a:r>
             <a:r>
               <a:rPr lang="en-US" dirty="0" smtClean="0"/>
-              <a:t> </a:t>
-            </a:r>
-            <a:r>
-              <a:rPr lang="en-US" dirty="0" smtClean="0"/>
-              <a:t>specified </a:t>
-            </a:r>
-            <a:r>
-              <a:rPr lang="en-US" dirty="0" smtClean="0"/>
-              <a:t>using</a:t>
-            </a:r>
-            <a:r>
-              <a:rPr lang="en-US" dirty="0" smtClean="0"/>
-              <a:t> </a:t>
-            </a:r>
-            <a:r>
-              <a:rPr lang="en-US" dirty="0" smtClean="0"/>
-              <a:t>Property Tables</a:t>
+              <a:t> specified using Property Tables</a:t>
             </a:r>
           </a:p>
           <a:p>
@@ -7667,32 +7805,17 @@
               <a:rPr lang="en-US" dirty="0" smtClean="0">
                 <a:latin typeface="Calibri" panose="020F0502020204030204" pitchFamily="34" charset="0"/>
               </a:rPr>
-              <a:t>Interim </a:t>
-            </a:r>
+              <a:t>Interim step toward formal abstract specifications?</a:t>
+            </a:r>
+          </a:p>
+          <a:p>
+            <a:pPr lvl="2"/>
             <a:r>
               <a:rPr lang="en-US" dirty="0" smtClean="0">
                 <a:latin typeface="Calibri" panose="020F0502020204030204" pitchFamily="34" charset="0"/>
               </a:rPr>
-              <a:t>step toward formal abstract specifications?</a:t>
-            </a:r>
-          </a:p>
-          <a:p>
-            <a:pPr lvl="2"/>
-            <a:r>
-              <a:rPr lang="en-US" dirty="0" smtClean="0">
-                <a:latin typeface="Calibri" panose="020F0502020204030204" pitchFamily="34" charset="0"/>
-              </a:rPr>
-              <a:t>Would enable automated translation to concrete </a:t>
-            </a:r>
-            <a:r>
-              <a:rPr lang="en-US" dirty="0" smtClean="0">
-                <a:latin typeface="Calibri" panose="020F0502020204030204" pitchFamily="34" charset="0"/>
-              </a:rPr>
-              <a:t>schemas:</a:t>
-            </a:r>
-            <a:endParaRPr lang="en-US" dirty="0" smtClean="0">
-              <a:latin typeface="Calibri" panose="020F0502020204030204" pitchFamily="34" charset="0"/>
-            </a:endParaRPr>
+              <a:t>Would enable automated translation to concrete schemas:</a:t>
+            </a:r>
           </a:p>
           <a:p>
             <a:pPr lvl="3"/>
@@ -7940,11 +8063,7 @@
           <a:p>
             <a:r>
               <a:rPr lang="en-US" dirty="0" smtClean="0"/>
-              <a:t>Current implementation: </a:t>
-            </a:r>
-            <a:r>
-              <a:rPr lang="en-US" dirty="0" smtClean="0"/>
-              <a:t>Python abstract data structures</a:t>
+              <a:t>Current implementation: Python abstract data structures</a:t>
             </a:r>
             <a:endParaRPr lang="en-US" dirty="0" smtClean="0">
               <a:latin typeface="Calibri" panose="020F0502020204030204" pitchFamily="34" charset="0"/>
@@ -7988,22 +8107,25 @@
               <a:rPr lang="en-US" dirty="0" smtClean="0">
                 <a:latin typeface="Calibri" panose="020F0502020204030204" pitchFamily="34" charset="0"/>
               </a:rPr>
-              <a:t>Defines </a:t>
-            </a:r>
+              <a:t>Defines OpenC2 abstract syntax</a:t>
+            </a:r>
+          </a:p>
+          <a:p>
+            <a:pPr lvl="3"/>
             <a:r>
               <a:rPr lang="en-US" dirty="0" smtClean="0">
                 <a:latin typeface="Calibri" panose="020F0502020204030204" pitchFamily="34" charset="0"/>
               </a:rPr>
-              <a:t>OpenC2 abstract syntax</a:t>
-            </a:r>
-          </a:p>
-          <a:p>
-            <a:pPr lvl="3"/>
+              <a:t>Unambiguous type checking</a:t>
+            </a:r>
+          </a:p>
+          <a:p>
+            <a:pPr lvl="2"/>
             <a:r>
               <a:rPr lang="en-US" dirty="0" smtClean="0">
                 <a:latin typeface="Calibri" panose="020F0502020204030204" pitchFamily="34" charset="0"/>
               </a:rPr>
-              <a:t>Unambiguous type checking</a:t>
+              <a:t>Validates example messages</a:t>
             </a:r>
           </a:p>
           <a:p>
@@ -8012,28 +8134,7 @@
               <a:rPr lang="en-US" dirty="0" smtClean="0">
                 <a:latin typeface="Calibri" panose="020F0502020204030204" pitchFamily="34" charset="0"/>
               </a:rPr>
-              <a:t>Validates example </a:t>
-            </a:r>
-            <a:r>
-              <a:rPr lang="en-US" dirty="0" smtClean="0">
-                <a:latin typeface="Calibri" panose="020F0502020204030204" pitchFamily="34" charset="0"/>
-              </a:rPr>
-              <a:t>messages</a:t>
-            </a:r>
-          </a:p>
-          <a:p>
-            <a:pPr lvl="2"/>
-            <a:r>
-              <a:rPr lang="en-US" dirty="0" smtClean="0">
-                <a:latin typeface="Calibri" panose="020F0502020204030204" pitchFamily="34" charset="0"/>
-              </a:rPr>
-              <a:t>Supports </a:t>
-            </a:r>
-            <a:r>
-              <a:rPr lang="en-US" dirty="0" smtClean="0">
-                <a:latin typeface="Calibri" panose="020F0502020204030204" pitchFamily="34" charset="0"/>
-              </a:rPr>
-              <a:t>multiple message formats</a:t>
+              <a:t>Supports multiple message formats</a:t>
             </a:r>
           </a:p>
           <a:p>
@@ -8086,19 +8187,7 @@
               <a:rPr lang="en-US" dirty="0" smtClean="0">
                 <a:latin typeface="Calibri" panose="020F0502020204030204" pitchFamily="34" charset="0"/>
               </a:rPr>
-              <a:t>property </a:t>
-            </a:r>
-            <a:r>
-              <a:rPr lang="en-US" dirty="0" smtClean="0">
-                <a:latin typeface="Calibri" panose="020F0502020204030204" pitchFamily="34" charset="0"/>
-              </a:rPr>
-              <a:t>tables </a:t>
-            </a:r>
-            <a:r>
-              <a:rPr lang="en-US" dirty="0" smtClean="0">
-                <a:latin typeface="Calibri" panose="020F0502020204030204" pitchFamily="34" charset="0"/>
-              </a:rPr>
-              <a:t>and formal</a:t>
+              <a:t>property tables and formal</a:t>
             </a:r>
             <a:br>
               <a:rPr lang="en-US" dirty="0" smtClean="0">
@@ -8123,9 +8212,6 @@
               </a:rPr>
               <a:t>syntax</a:t>
             </a:r>
-            <a:endParaRPr lang="en-US" dirty="0" smtClean="0">
-              <a:latin typeface="Calibri" panose="020F0502020204030204" pitchFamily="34" charset="0"/>
-            </a:endParaRPr>
           </a:p>
         </p:txBody>
       </p:sp>
@@ -8527,14 +8613,7 @@
                 <a:latin typeface="Consolas" panose="020B0609020204030204" pitchFamily="49" charset="0"/>
                 <a:cs typeface="Consolas" panose="020B0609020204030204" pitchFamily="49" charset="0"/>
               </a:rPr>
-              <a:t>        </a:t>
-            </a:r>
-            <a:r>
-              <a:rPr lang="en-US" sz="1000" dirty="0" smtClean="0">
-                <a:latin typeface="Consolas" panose="020B0609020204030204" pitchFamily="49" charset="0"/>
-                <a:cs typeface="Consolas" panose="020B0609020204030204" pitchFamily="49" charset="0"/>
-              </a:rPr>
-              <a:t>'remediate</a:t>
+              <a:t>        'remediate</a:t>
             </a:r>
             <a:r>
               <a:rPr lang="en-US" sz="1000" dirty="0">
@@ -8853,7 +8932,15 @@
             <a:pPr lvl="2"/>
             <a:r>
               <a:rPr lang="en-US" dirty="0" smtClean="0"/>
-              <a:t>Item has position (ordinal index), no name</a:t>
+              <a:t>Item has </a:t>
+            </a:r>
+            <a:r>
+              <a:rPr lang="en-US" dirty="0" smtClean="0"/>
+              <a:t>position, </a:t>
+            </a:r>
+            <a:r>
+              <a:rPr lang="en-US" dirty="0" smtClean="0"/>
+              <a:t>no name</a:t>
             </a:r>
           </a:p>
           <a:p>
@@ -8867,8 +8954,13 @@
             <a:pPr lvl="2"/>
             <a:r>
               <a:rPr lang="en-US" dirty="0" smtClean="0"/>
-              <a:t>Property has name, no index</a:t>
-            </a:r>
+              <a:t>Property has name, no </a:t>
+            </a:r>
+            <a:r>
+              <a:rPr lang="en-US" dirty="0" smtClean="0"/>
+              <a:t>position</a:t>
+            </a:r>
+            <a:endParaRPr lang="en-US" dirty="0" smtClean="0"/>
           </a:p>
           <a:p>
             <a:r>
@@ -8887,11 +8979,11 @@
             <a:pPr lvl="2"/>
             <a:r>
               <a:rPr lang="en-US" dirty="0" smtClean="0"/>
-              <a:t>Field has both </a:t>
+              <a:t>Field has both name and </a:t>
             </a:r>
             <a:r>
               <a:rPr lang="en-US" dirty="0" smtClean="0"/>
-              <a:t>name and index</a:t>
+              <a:t>position</a:t>
             </a:r>
             <a:endParaRPr lang="en-US" dirty="0" smtClean="0"/>
           </a:p>
@@ -8910,13 +9002,24 @@
             <a:pPr lvl="2"/>
             <a:r>
               <a:rPr lang="en-US" dirty="0"/>
-              <a:t>Decoder restores names to Array fields, indices to Object </a:t>
+              <a:t>Decoder restores names to Array fields, </a:t>
+            </a:r>
+            <a:r>
+              <a:rPr lang="en-US" dirty="0" smtClean="0"/>
+              <a:t>position</a:t>
+            </a:r>
+            <a:r>
+              <a:rPr lang="en-US" dirty="0" smtClean="0"/>
+              <a:t>s </a:t>
+            </a:r>
+            <a:r>
+              <a:rPr lang="en-US" dirty="0"/>
+              <a:t>to Object </a:t>
             </a:r>
             <a:r>
               <a:rPr lang="en-US" dirty="0" smtClean="0"/>
               <a:t>fields</a:t>
             </a:r>
-            <a:endParaRPr lang="en-US" dirty="0" smtClean="0"/>
           </a:p>
           <a:p>
             <a:pPr lvl="1"/>
@@ -8924,14 +9027,18 @@
               <a:rPr lang="en-US" dirty="0" smtClean="0"/>
               <a:t>Map – unordered set of fields</a:t>
             </a:r>
+          </a:p>
+          <a:p>
+            <a:pPr lvl="2"/>
+            <a:r>
+              <a:rPr lang="en-US" dirty="0" smtClean="0"/>
+              <a:t>Field has name, no </a:t>
+            </a:r>
+            <a:r>
+              <a:rPr lang="en-US" dirty="0" smtClean="0"/>
+              <a:t>position</a:t>
+            </a:r>
             <a:endParaRPr lang="en-US" dirty="0" smtClean="0"/>
-          </a:p>
-          <a:p>
-            <a:pPr lvl="2"/>
-            <a:r>
-              <a:rPr lang="en-US" dirty="0" smtClean="0"/>
-              <a:t>Field has name, no index</a:t>
-            </a:r>
           </a:p>
           <a:p>
             <a:pPr lvl="2"/>
@@ -9359,7 +9466,6 @@
               <a:rPr lang="en-US" dirty="0" smtClean="0"/>
               <a:t>Literals in a vocabulary (e.g., “ipv4-address-object”, “TCP”, “scan”)</a:t>
             </a:r>
-            <a:endParaRPr lang="en-US" dirty="0" smtClean="0"/>
           </a:p>
           <a:p>
             <a:r>
@@ -9627,40 +9733,22 @@
                 <a:latin typeface="Consolas" panose="020B0609020204030204" pitchFamily="49" charset="0"/>
                 <a:cs typeface="Consolas" panose="020B0609020204030204" pitchFamily="49" charset="0"/>
               </a:rPr>
-              <a:t>        </a:t>
+              <a:t>        'remediate</a:t>
+            </a:r>
+            <a:r>
+              <a:rPr lang="en-US" sz="1000" dirty="0">
+                <a:latin typeface="Consolas" panose="020B0609020204030204" pitchFamily="49" charset="0"/>
+                <a:cs typeface="Consolas" panose="020B0609020204030204" pitchFamily="49" charset="0"/>
+              </a:rPr>
+              <a:t>']   </a:t>
             </a:r>
             <a:r>
               <a:rPr lang="en-US" sz="1000" dirty="0" smtClean="0">
                 <a:latin typeface="Consolas" panose="020B0609020204030204" pitchFamily="49" charset="0"/>
                 <a:cs typeface="Consolas" panose="020B0609020204030204" pitchFamily="49" charset="0"/>
               </a:rPr>
-              <a:t>'remediate</a:t>
-            </a:r>
-            <a:r>
-              <a:rPr lang="en-US" sz="1000" dirty="0">
-                <a:latin typeface="Consolas" panose="020B0609020204030204" pitchFamily="49" charset="0"/>
-                <a:cs typeface="Consolas" panose="020B0609020204030204" pitchFamily="49" charset="0"/>
-              </a:rPr>
-              <a:t>']   </a:t>
-            </a:r>
-            <a:r>
-              <a:rPr lang="en-US" sz="1000" dirty="0" smtClean="0">
-                <a:latin typeface="Consolas" panose="020B0609020204030204" pitchFamily="49" charset="0"/>
-                <a:cs typeface="Consolas" panose="020B0609020204030204" pitchFamily="49" charset="0"/>
-              </a:rPr>
-              <a:t># </a:t>
-            </a:r>
-            <a:r>
-              <a:rPr lang="en-US" sz="1000" dirty="0" smtClean="0">
-                <a:latin typeface="Consolas" panose="020B0609020204030204" pitchFamily="49" charset="0"/>
-                <a:cs typeface="Consolas" panose="020B0609020204030204" pitchFamily="49" charset="0"/>
-              </a:rPr>
-              <a:t>35</a:t>
-            </a:r>
-            <a:endParaRPr lang="en-US" sz="1000" dirty="0" smtClean="0">
-              <a:latin typeface="Consolas" panose="020B0609020204030204" pitchFamily="49" charset="0"/>
-              <a:cs typeface="Consolas" panose="020B0609020204030204" pitchFamily="49" charset="0"/>
-            </a:endParaRPr>
+              <a:t># 35</a:t>
+            </a:r>
           </a:p>
         </p:txBody>
       </p:sp>

</xml_diff>